<commit_message>
Multiple file to One file
</commit_message>
<xml_diff>
--- a/Examples/Data/Slides/CRUD/AccessSlides.pptx
+++ b/Examples/Data/Slides/CRUD/AccessSlides.pptx
@@ -5,16 +5,17 @@
     <p:sldMasterId id="2147483648" r:id="rId1"/>
   </p:sldMasterIdLst>
   <p:notesMasterIdLst>
-    <p:notesMasterId r:id="rId4"/>
+    <p:notesMasterId r:id="rId5"/>
   </p:notesMasterIdLst>
   <p:sldIdLst>
     <p:sldId id="256" r:id="rId2"/>
     <p:sldId id="257" r:id="rId3"/>
+    <p:sldId id="260" r:id="rId4"/>
   </p:sldIdLst>
   <p:sldSz cx="9144000" cy="6858000" type="screen4x3"/>
   <p:notesSz cx="6858000" cy="9144000"/>
   <p:custDataLst>
-    <p:tags r:id="rId5"/>
+    <p:tags r:id="rId6"/>
   </p:custDataLst>
   <p:defaultTextStyle>
     <a:defPPr algn="l" rtl="0" eaLnBrk="1" hangingPunct="1">
@@ -229,7 +230,7 @@
           <a:p>
             <a:fld id="{429852AA-C48A-4FFA-81AB-222B502AE691}" type="datetimeFigureOut">
               <a:rPr lang="en-US" smtClean="0"/>
-              <a:t>6/7/2016</a:t>
+              <a:t>5/13/2021</a:t>
             </a:fld>
             <a:endParaRPr lang="en-US"/>
           </a:p>
@@ -679,6 +680,100 @@
 </p:notes>
 </file>
 
+<file path=ppt/notesSlides/notesSlide3.xml><?xml version="1.0" encoding="utf-8"?>
+<p:notes xmlns:a="http://schemas.openxmlformats.org/drawingml/2006/main" xmlns:r="http://schemas.openxmlformats.org/officeDocument/2006/relationships" xmlns:p="http://schemas.openxmlformats.org/presentationml/2006/main">
+  <p:cSld>
+    <p:spTree>
+      <p:nvGrpSpPr>
+        <p:cNvPr id="1" name=""/>
+        <p:cNvGrpSpPr/>
+        <p:nvPr/>
+      </p:nvGrpSpPr>
+      <p:grpSpPr>
+        <a:xfrm>
+          <a:off x="0" y="0"/>
+          <a:ext cx="0" cy="0"/>
+          <a:chOff x="0" y="0"/>
+          <a:chExt cx="0" cy="0"/>
+        </a:xfrm>
+      </p:grpSpPr>
+      <p:sp>
+        <p:nvSpPr>
+          <p:cNvPr id="2" name="Slide Image Placeholder 1"/>
+          <p:cNvSpPr>
+            <a:spLocks noGrp="1" noRot="1" noChangeAspect="1"/>
+          </p:cNvSpPr>
+          <p:nvPr>
+            <p:ph type="sldImg"/>
+          </p:nvPr>
+        </p:nvSpPr>
+        <p:spPr/>
+      </p:sp>
+      <p:sp>
+        <p:nvSpPr>
+          <p:cNvPr id="3" name="Notes Placeholder 2"/>
+          <p:cNvSpPr>
+            <a:spLocks noGrp="1"/>
+          </p:cNvSpPr>
+          <p:nvPr>
+            <p:ph type="body" idx="1"/>
+          </p:nvPr>
+        </p:nvSpPr>
+        <p:spPr/>
+        <p:txBody>
+          <a:bodyPr/>
+          <a:lstStyle/>
+          <a:p>
+            <a:r>
+              <a:rPr lang="en-US" smtClean="0"/>
+              <a:t>Slide no</a:t>
+            </a:r>
+            <a:r>
+              <a:rPr lang="en-US" baseline="0" smtClean="0"/>
+              <a:t> two nodes</a:t>
+            </a:r>
+          </a:p>
+          <a:p>
+            <a:endParaRPr lang="en-US" dirty="0"/>
+          </a:p>
+        </p:txBody>
+      </p:sp>
+      <p:sp>
+        <p:nvSpPr>
+          <p:cNvPr id="4" name="Slide Number Placeholder 3"/>
+          <p:cNvSpPr>
+            <a:spLocks noGrp="1"/>
+          </p:cNvSpPr>
+          <p:nvPr>
+            <p:ph type="sldNum" sz="quarter" idx="10"/>
+          </p:nvPr>
+        </p:nvSpPr>
+        <p:spPr/>
+        <p:txBody>
+          <a:bodyPr/>
+          <a:lstStyle/>
+          <a:p>
+            <a:fld id="{C39AEA4E-93BD-4584-8163-70A2B55BE655}" type="slidenum">
+              <a:rPr lang="en-US" smtClean="0"/>
+              <a:t>3</a:t>
+            </a:fld>
+            <a:endParaRPr lang="en-US"/>
+          </a:p>
+        </p:txBody>
+      </p:sp>
+    </p:spTree>
+    <p:extLst>
+      <p:ext uri="{BB962C8B-B14F-4D97-AF65-F5344CB8AC3E}">
+        <p14:creationId xmlns:p14="http://schemas.microsoft.com/office/powerpoint/2010/main" val="433681803"/>
+      </p:ext>
+    </p:extLst>
+  </p:cSld>
+  <p:clrMapOvr>
+    <a:masterClrMapping/>
+  </p:clrMapOvr>
+</p:notes>
+</file>
+
 <file path=ppt/slideLayouts/slideLayout1.xml><?xml version="1.0" encoding="utf-8"?>
 <p:sldLayout xmlns:a="http://schemas.openxmlformats.org/drawingml/2006/main" xmlns:r="http://schemas.openxmlformats.org/officeDocument/2006/relationships" xmlns:p="http://schemas.openxmlformats.org/presentationml/2006/main" type="blank" preserve="1">
   <p:cSld name="Blank">
@@ -713,7 +808,7 @@
           <a:p>
             <a:fld id="{E8FD0B7A-F5DD-4F40-B4CB-3B2C354B893A}" type="datetimeFigureOut">
               <a:rPr lang="en-US" smtClean="0"/>
-              <a:t>6/7/2016</a:t>
+              <a:t>5/13/2021</a:t>
             </a:fld>
             <a:endParaRPr lang="en-US"/>
           </a:p>
@@ -1934,6 +2029,351 @@
         </p:txBody>
       </p:sp>
     </p:spTree>
+  </p:cSld>
+  <p:clrMapOvr>
+    <a:masterClrMapping/>
+  </p:clrMapOvr>
+  <p:transition/>
+  <p:timing>
+    <p:tnLst>
+      <p:par>
+        <p:cTn id="1" dur="indefinite" restart="never" nodeType="tmRoot"/>
+      </p:par>
+    </p:tnLst>
+  </p:timing>
+</p:sld>
+</file>
+
+<file path=ppt/slides/slide3.xml><?xml version="1.0" encoding="utf-8"?>
+<p:sld xmlns:a="http://schemas.openxmlformats.org/drawingml/2006/main" xmlns:r="http://schemas.openxmlformats.org/officeDocument/2006/relationships" xmlns:p="http://schemas.openxmlformats.org/presentationml/2006/main">
+  <p:cSld>
+    <p:spTree>
+      <p:nvGrpSpPr>
+        <p:cNvPr id="1" name=""/>
+        <p:cNvGrpSpPr/>
+        <p:nvPr/>
+      </p:nvGrpSpPr>
+      <p:grpSpPr>
+        <a:xfrm>
+          <a:off x="0" y="0"/>
+          <a:ext cx="0" cy="0"/>
+          <a:chOff x="0" y="0"/>
+          <a:chExt cx="0" cy="0"/>
+        </a:xfrm>
+      </p:grpSpPr>
+      <p:sp>
+        <p:nvSpPr>
+          <p:cNvPr id="3074" name="Title 1"/>
+          <p:cNvSpPr>
+            <a:spLocks noGrp="1"/>
+          </p:cNvSpPr>
+          <p:nvPr>
+            <p:ph type="title" idx="4294967295"/>
+          </p:nvPr>
+        </p:nvSpPr>
+        <p:spPr>
+          <a:xfrm>
+            <a:off x="457200" y="274638"/>
+            <a:ext cx="8229600" cy="1143000"/>
+          </a:xfrm>
+          <a:prstGeom prst="rect">
+            <a:avLst/>
+          </a:prstGeom>
+          <a:noFill/>
+          <a:ln w="9525">
+            <a:noFill/>
+            <a:miter lim="800000"/>
+          </a:ln>
+        </p:spPr>
+        <p:txBody>
+          <a:bodyPr vert="horz" wrap="square" lIns="91440" tIns="45720" rIns="91440" bIns="45720" anchor="ctr" anchorCtr="0">
+            <a:noAutofit/>
+          </a:bodyPr>
+          <a:lstStyle>
+            <a:lvl1pPr marL="0" indent="0" algn="ctr" defTabSz="914400" rtl="0" eaLnBrk="1" fontAlgn="base" hangingPunct="1">
+              <a:lnSpc>
+                <a:spcPct val="100000"/>
+              </a:lnSpc>
+              <a:spcBef>
+                <a:spcPct val="0"/>
+              </a:spcBef>
+              <a:spcAft>
+                <a:spcPct val="0"/>
+              </a:spcAft>
+              <a:buClrTx/>
+              <a:buSzTx/>
+              <a:buFontTx/>
+              <a:buNone/>
+              <a:defRPr kumimoji="0" sz="4400" b="0" i="0" u="none">
+                <a:solidFill>
+                  <a:schemeClr val="tx1"/>
+                </a:solidFill>
+                <a:latin typeface="Calibri" pitchFamily="2" charset="0"/>
+              </a:defRPr>
+            </a:lvl1pPr>
+          </a:lstStyle>
+          <a:p>
+            <a:pPr lvl="0"/>
+            <a:r>
+              <a:rPr dirty="0" err="1">
+                <a:solidFill>
+                  <a:srgbClr val="558ED5"/>
+                </a:solidFill>
+              </a:rPr>
+              <a:t>Aspose.Slides</a:t>
+            </a:r>
+            <a:r>
+              <a:rPr dirty="0">
+                <a:solidFill>
+                  <a:srgbClr val="558ED5"/>
+                </a:solidFill>
+              </a:rPr>
+              <a:t> for .NET</a:t>
+            </a:r>
+          </a:p>
+        </p:txBody>
+      </p:sp>
+      <p:sp>
+        <p:nvSpPr>
+          <p:cNvPr id="3075" name="Content Placeholder 2"/>
+          <p:cNvSpPr>
+            <a:spLocks noGrp="1"/>
+          </p:cNvSpPr>
+          <p:nvPr>
+            <p:ph idx="4294967295"/>
+          </p:nvPr>
+        </p:nvSpPr>
+        <p:spPr>
+          <a:xfrm>
+            <a:off x="457200" y="1600200"/>
+            <a:ext cx="8229600" cy="4525962"/>
+          </a:xfrm>
+          <a:prstGeom prst="rect">
+            <a:avLst/>
+          </a:prstGeom>
+          <a:noFill/>
+          <a:ln w="9525">
+            <a:noFill/>
+            <a:miter lim="800000"/>
+          </a:ln>
+        </p:spPr>
+        <p:txBody>
+          <a:bodyPr vert="horz" wrap="square" lIns="91440" tIns="45720" rIns="91440" bIns="45720" anchor="t" anchorCtr="0">
+            <a:noAutofit/>
+          </a:bodyPr>
+          <a:lstStyle>
+            <a:lvl1pPr marL="342900" indent="-342900" algn="l" defTabSz="914400" rtl="0" eaLnBrk="1" fontAlgn="base" hangingPunct="1">
+              <a:lnSpc>
+                <a:spcPct val="100000"/>
+              </a:lnSpc>
+              <a:spcBef>
+                <a:spcPct val="20000"/>
+              </a:spcBef>
+              <a:spcAft>
+                <a:spcPct val="0"/>
+              </a:spcAft>
+              <a:buClrTx/>
+              <a:buSzTx/>
+              <a:buFont typeface="Arial" charset="0"/>
+              <a:buChar char="•"/>
+              <a:defRPr kumimoji="0" sz="3200" b="0" i="0" u="none">
+                <a:solidFill>
+                  <a:schemeClr val="tx1"/>
+                </a:solidFill>
+                <a:latin typeface="Calibri" pitchFamily="2" charset="0"/>
+              </a:defRPr>
+            </a:lvl1pPr>
+            <a:lvl2pPr marL="742950" indent="-285750" algn="l" defTabSz="914400" rtl="0" eaLnBrk="1" fontAlgn="base" hangingPunct="1">
+              <a:lnSpc>
+                <a:spcPct val="100000"/>
+              </a:lnSpc>
+              <a:spcBef>
+                <a:spcPct val="20000"/>
+              </a:spcBef>
+              <a:spcAft>
+                <a:spcPct val="0"/>
+              </a:spcAft>
+              <a:buClrTx/>
+              <a:buSzTx/>
+              <a:buFont typeface="Arial" charset="0"/>
+              <a:buChar char="–"/>
+              <a:defRPr kumimoji="0" sz="2800" b="0" i="0" u="none">
+                <a:solidFill>
+                  <a:schemeClr val="tx1"/>
+                </a:solidFill>
+                <a:latin typeface="Calibri" pitchFamily="2" charset="0"/>
+              </a:defRPr>
+            </a:lvl2pPr>
+            <a:lvl3pPr marL="1143000" indent="-228600" algn="l" defTabSz="914400" rtl="0" eaLnBrk="1" fontAlgn="base" hangingPunct="1">
+              <a:lnSpc>
+                <a:spcPct val="100000"/>
+              </a:lnSpc>
+              <a:spcBef>
+                <a:spcPct val="20000"/>
+              </a:spcBef>
+              <a:spcAft>
+                <a:spcPct val="0"/>
+              </a:spcAft>
+              <a:buClrTx/>
+              <a:buSzTx/>
+              <a:buFont typeface="Arial" charset="0"/>
+              <a:buChar char="•"/>
+              <a:defRPr kumimoji="0" sz="2400" b="0" i="0" u="none">
+                <a:solidFill>
+                  <a:schemeClr val="tx1"/>
+                </a:solidFill>
+                <a:latin typeface="Calibri" pitchFamily="2" charset="0"/>
+              </a:defRPr>
+            </a:lvl3pPr>
+            <a:lvl4pPr marL="1600200" indent="-228600" algn="l" defTabSz="914400" rtl="0" eaLnBrk="1" fontAlgn="base" hangingPunct="1">
+              <a:lnSpc>
+                <a:spcPct val="100000"/>
+              </a:lnSpc>
+              <a:spcBef>
+                <a:spcPct val="20000"/>
+              </a:spcBef>
+              <a:spcAft>
+                <a:spcPct val="0"/>
+              </a:spcAft>
+              <a:buClrTx/>
+              <a:buSzTx/>
+              <a:buFont typeface="Arial" charset="0"/>
+              <a:buChar char="–"/>
+              <a:defRPr kumimoji="0" sz="2000" b="0" i="0" u="none">
+                <a:solidFill>
+                  <a:schemeClr val="tx1"/>
+                </a:solidFill>
+                <a:latin typeface="Calibri" pitchFamily="2" charset="0"/>
+              </a:defRPr>
+            </a:lvl4pPr>
+            <a:lvl5pPr marL="2057400" indent="-228600" algn="l" defTabSz="914400" rtl="0" eaLnBrk="1" fontAlgn="base" hangingPunct="1">
+              <a:lnSpc>
+                <a:spcPct val="100000"/>
+              </a:lnSpc>
+              <a:spcBef>
+                <a:spcPct val="20000"/>
+              </a:spcBef>
+              <a:spcAft>
+                <a:spcPct val="0"/>
+              </a:spcAft>
+              <a:buClrTx/>
+              <a:buSzTx/>
+              <a:buFont typeface="Arial" charset="0"/>
+              <a:buChar char="»"/>
+              <a:defRPr kumimoji="0" sz="2000" b="0" i="0" u="none">
+                <a:solidFill>
+                  <a:schemeClr val="tx1"/>
+                </a:solidFill>
+                <a:latin typeface="Calibri" pitchFamily="2" charset="0"/>
+              </a:defRPr>
+            </a:lvl5pPr>
+          </a:lstStyle>
+          <a:p>
+            <a:pPr lvl="0"/>
+            <a:r>
+              <a:rPr dirty="0" smtClean="0">
+                <a:solidFill>
+                  <a:srgbClr val="FF0000"/>
+                </a:solidFill>
+              </a:rPr>
+              <a:t>Welcome</a:t>
+            </a:r>
+            <a:r>
+              <a:rPr lang="en-US" dirty="0" smtClean="0">
+                <a:solidFill>
+                  <a:srgbClr val="FF0000"/>
+                </a:solidFill>
+              </a:rPr>
+              <a:t> from </a:t>
+            </a:r>
+            <a:r>
+              <a:rPr lang="en-US" dirty="0" err="1" smtClean="0">
+                <a:solidFill>
+                  <a:srgbClr val="FF0000"/>
+                </a:solidFill>
+              </a:rPr>
+              <a:t>Fabbi</a:t>
+            </a:r>
+            <a:r>
+              <a:rPr lang="en-US" dirty="0" smtClean="0">
+                <a:solidFill>
+                  <a:srgbClr val="FF0000"/>
+                </a:solidFill>
+              </a:rPr>
+              <a:t> JSC</a:t>
+            </a:r>
+            <a:endParaRPr dirty="0">
+              <a:solidFill>
+                <a:srgbClr val="FF0000"/>
+              </a:solidFill>
+            </a:endParaRPr>
+          </a:p>
+          <a:p>
+            <a:r>
+              <a:rPr dirty="0">
+                <a:solidFill>
+                  <a:srgbClr val="376092"/>
+                </a:solidFill>
+              </a:rPr>
+              <a:t>Hello </a:t>
+            </a:r>
+            <a:r>
+              <a:rPr dirty="0" smtClean="0">
+                <a:solidFill>
+                  <a:srgbClr val="376092"/>
+                </a:solidFill>
+              </a:rPr>
+              <a:t>World</a:t>
+            </a:r>
+            <a:r>
+              <a:rPr lang="en-US" dirty="0" smtClean="0">
+                <a:solidFill>
+                  <a:srgbClr val="376092"/>
+                </a:solidFill>
+              </a:rPr>
+              <a:t> </a:t>
+            </a:r>
+            <a:r>
+              <a:rPr lang="en-US" dirty="0">
+                <a:solidFill>
+                  <a:srgbClr val="FF0000"/>
+                </a:solidFill>
+              </a:rPr>
+              <a:t>from </a:t>
+            </a:r>
+            <a:r>
+              <a:rPr lang="en-US" dirty="0" err="1">
+                <a:solidFill>
+                  <a:srgbClr val="FF0000"/>
+                </a:solidFill>
+              </a:rPr>
+              <a:t>Fabbi</a:t>
+            </a:r>
+            <a:r>
+              <a:rPr lang="en-US" dirty="0">
+                <a:solidFill>
+                  <a:srgbClr val="FF0000"/>
+                </a:solidFill>
+              </a:rPr>
+              <a:t> JSC</a:t>
+            </a:r>
+          </a:p>
+          <a:p>
+            <a:pPr lvl="0"/>
+            <a:endParaRPr dirty="0">
+              <a:solidFill>
+                <a:srgbClr val="376092"/>
+              </a:solidFill>
+            </a:endParaRPr>
+          </a:p>
+        </p:txBody>
+      </p:sp>
+    </p:spTree>
+    <p:extLst>
+      <p:ext uri="{BB962C8B-B14F-4D97-AF65-F5344CB8AC3E}">
+        <p14:creationId xmlns:p14="http://schemas.microsoft.com/office/powerpoint/2010/main" val="1994321314"/>
+      </p:ext>
+    </p:extLst>
   </p:cSld>
   <p:clrMapOvr>
     <a:masterClrMapping/>

</xml_diff>